<commit_message>
push to test branch
</commit_message>
<xml_diff>
--- a/Конспект за Олимпиада ИТ.pptx
+++ b/Конспект за Олимпиада ИТ.pptx
@@ -6567,6 +6567,37 @@
           <a:bodyPr/>
           <a:lstStyle/>
           <a:p>
+            <a:r>
+              <a:rPr lang="en-US" dirty="0" err="1" smtClean="0"/>
+              <a:t>Procesora</a:t>
+            </a:r>
+            <a:r>
+              <a:rPr lang="en-US" dirty="0" smtClean="0"/>
+              <a:t> </a:t>
+            </a:r>
+            <a:r>
+              <a:rPr lang="en-US" dirty="0" err="1" smtClean="0"/>
+              <a:t>sluji</a:t>
+            </a:r>
+            <a:r>
+              <a:rPr lang="en-US" dirty="0" smtClean="0"/>
+              <a:t> </a:t>
+            </a:r>
+            <a:r>
+              <a:rPr lang="en-US" dirty="0" err="1" smtClean="0"/>
+              <a:t>za</a:t>
+            </a:r>
+            <a:r>
+              <a:rPr lang="en-US" dirty="0" smtClean="0"/>
+              <a:t> </a:t>
+            </a:r>
+            <a:endParaRPr lang="en-US" dirty="0" smtClean="0"/>
+          </a:p>
+          <a:p>
+            <a:r>
+              <a:rPr lang="en-US" smtClean="0"/>
+              <a:t>asdfasdf</a:t>
+            </a:r>
             <a:endParaRPr lang="en-US" dirty="0"/>
           </a:p>
         </p:txBody>

</xml_diff>